<commit_message>
Fix error in slides
</commit_message>
<xml_diff>
--- a/Tool-Demo-Presentation-AutoCodeRover.pptx
+++ b/Tool-Demo-Presentation-AutoCodeRover.pptx
@@ -280,7 +280,7 @@
       </p15:sldGuideLst>
     </p:ext>
     <p:ext uri="GoogleSlidesCustomDataVersion2">
-      <go:slidesCustomData xmlns="" xmlns:mc="http://schemas.openxmlformats.org/markup-compatibility/2006" xmlns:mv="urn:schemas-microsoft-com:mac:vml" xmlns:c="http://schemas.openxmlformats.org/drawingml/2006/chart" xmlns:dgm="http://schemas.openxmlformats.org/drawingml/2006/diagram" xmlns:o="urn:schemas-microsoft-com:office:office" xmlns:v="urn:schemas-microsoft-com:vml" xmlns:pvml="urn:schemas-microsoft-com:office:powerpoint" xmlns:com="http://schemas.openxmlformats.org/drawingml/2006/compatibility" xmlns:p14="http://schemas.microsoft.com/office/powerpoint/2010/main" xmlns:p15="http://schemas.microsoft.com/office/powerpoint/2012/main" xmlns:ahyp="http://schemas.microsoft.com/office/drawing/2018/hyperlinkcolor" xmlns:go="http://customooxmlschemas.google.com/" r:id="rId21" roundtripDataSignature="AMtx7mhMWrFCkVF2jCdePZTr9wWwUJHn6Q=="/>
+      <go:slidesCustomData xmlns:go="http://customooxmlschemas.google.com/" xmlns:ahyp="http://schemas.microsoft.com/office/drawing/2018/hyperlinkcolor" xmlns:p15="http://schemas.microsoft.com/office/powerpoint/2012/main" xmlns:p14="http://schemas.microsoft.com/office/powerpoint/2010/main" xmlns:com="http://schemas.openxmlformats.org/drawingml/2006/compatibility" xmlns:pvml="urn:schemas-microsoft-com:office:powerpoint" xmlns:v="urn:schemas-microsoft-com:vml" xmlns:o="urn:schemas-microsoft-com:office:office" xmlns:dgm="http://schemas.openxmlformats.org/drawingml/2006/diagram" xmlns:c="http://schemas.openxmlformats.org/drawingml/2006/chart" xmlns:mv="urn:schemas-microsoft-com:mac:vml" xmlns:mc="http://schemas.openxmlformats.org/markup-compatibility/2006" xmlns="" r:id="rId21" roundtripDataSignature="AMtx7mhMWrFCkVF2jCdePZTr9wWwUJHn6Q=="/>
     </p:ext>
   </p:extLst>
 </p:presentation>
@@ -7156,98 +7156,8 @@
                 <a:cs typeface="Arial"/>
                 <a:sym typeface="Arial"/>
               </a:rPr>
-              <a:t>Limitation</a:t>
-            </a:r>
-          </a:p>
-          <a:p>
-            <a:pPr marL="0" indent="0">
-              <a:lnSpc>
-                <a:spcPct val="115000"/>
-              </a:lnSpc>
-              <a:spcBef>
-                <a:spcPts val="1200"/>
-              </a:spcBef>
-              <a:buNone/>
-            </a:pPr>
-            <a:endParaRPr lang="en-CA" sz="2400" dirty="0">
-              <a:highlight>
-                <a:schemeClr val="lt1"/>
-              </a:highlight>
-              <a:latin typeface="Arial"/>
-              <a:ea typeface="Arial"/>
-              <a:cs typeface="Arial"/>
-              <a:sym typeface="Arial"/>
-            </a:endParaRPr>
-          </a:p>
-          <a:p>
-            <a:pPr marL="0" indent="0">
-              <a:lnSpc>
-                <a:spcPct val="115000"/>
-              </a:lnSpc>
-              <a:spcBef>
-                <a:spcPts val="1200"/>
-              </a:spcBef>
-              <a:buNone/>
-            </a:pPr>
-            <a:r>
-              <a:rPr lang="en-CA" sz="2400" dirty="0">
-                <a:solidFill>
-                  <a:schemeClr val="accent1"/>
-                </a:solidFill>
-                <a:highlight>
-                  <a:schemeClr val="lt1"/>
-                </a:highlight>
-                <a:latin typeface="Arial"/>
-                <a:ea typeface="Arial"/>
-                <a:cs typeface="Arial"/>
-                <a:sym typeface="Arial"/>
-              </a:rPr>
-              <a:t>IV.</a:t>
-            </a:r>
-            <a:r>
-              <a:rPr lang="en-CA" sz="2400" b="0" dirty="0">
-                <a:highlight>
-                  <a:schemeClr val="lt1"/>
-                </a:highlight>
-                <a:latin typeface="Arial"/>
-                <a:ea typeface="Arial"/>
-                <a:cs typeface="Arial"/>
-                <a:sym typeface="Arial"/>
-              </a:rPr>
-              <a:t> </a:t>
-            </a:r>
-            <a:r>
-              <a:rPr lang="en-CA" sz="2400" dirty="0">
-                <a:highlight>
-                  <a:schemeClr val="lt1"/>
-                </a:highlight>
-                <a:latin typeface="Arial"/>
-                <a:ea typeface="Arial"/>
-                <a:cs typeface="Arial"/>
-                <a:sym typeface="Arial"/>
-              </a:rPr>
               <a:t>Demo</a:t>
             </a:r>
-          </a:p>
-          <a:p>
-            <a:pPr marL="0" indent="0">
-              <a:lnSpc>
-                <a:spcPct val="115000"/>
-              </a:lnSpc>
-              <a:spcBef>
-                <a:spcPts val="1200"/>
-              </a:spcBef>
-              <a:buNone/>
-            </a:pPr>
-            <a:endParaRPr lang="en-CA" sz="2400" dirty="0">
-              <a:highlight>
-                <a:schemeClr val="lt1"/>
-              </a:highlight>
-              <a:latin typeface="Arial"/>
-              <a:ea typeface="Arial"/>
-              <a:cs typeface="Arial"/>
-              <a:sym typeface="Arial"/>
-            </a:endParaRPr>
           </a:p>
         </p:txBody>
       </p:sp>

</xml_diff>